<commit_message>
Chart, format, xlsx data source, xml datasource
</commit_message>
<xml_diff>
--- a/15_Ch73_API_Summary.pptx
+++ b/15_Ch73_API_Summary.pptx
@@ -10479,14 +10479,14 @@
           <p:nvPr>
             <p:extLst>
               <p:ext uri="{D42A27DB-BD31-4B8C-83A1-F6EECF244321}">
-                <p14:modId xmlns:p14="http://schemas.microsoft.com/office/powerpoint/2010/main" val="1667710352"/>
+                <p14:modId xmlns:p14="http://schemas.microsoft.com/office/powerpoint/2010/main" val="2036070540"/>
               </p:ext>
             </p:extLst>
           </p:nvPr>
         </p:nvGraphicFramePr>
         <p:xfrm>
-          <a:off x="649760" y="1806246"/>
-          <a:ext cx="7483319" cy="4070642"/>
+          <a:off x="437146" y="1751567"/>
+          <a:ext cx="8167301" cy="4070642"/>
         </p:xfrm>
         <a:graphic>
           <a:graphicData uri="http://schemas.openxmlformats.org/drawingml/2006/table">
@@ -10495,35 +10495,35 @@
                 <a:tableStyleId>{5C22544A-7EE6-4342-B048-85BDC9FD1C3A}</a:tableStyleId>
               </a:tblPr>
               <a:tblGrid>
-                <a:gridCol w="728980">
+                <a:gridCol w="769572">
                   <a:extLst>
                     <a:ext uri="{9D8B030D-6E8A-4147-A177-3AD203B41FA5}">
                       <a16:colId xmlns:a16="http://schemas.microsoft.com/office/drawing/2014/main" val="425712739"/>
                     </a:ext>
                   </a:extLst>
                 </a:gridCol>
-                <a:gridCol w="1877505">
+                <a:gridCol w="1982052">
                   <a:extLst>
                     <a:ext uri="{9D8B030D-6E8A-4147-A177-3AD203B41FA5}">
                       <a16:colId xmlns:a16="http://schemas.microsoft.com/office/drawing/2014/main" val="1870320283"/>
                     </a:ext>
                   </a:extLst>
                 </a:gridCol>
-                <a:gridCol w="821278">
+                <a:gridCol w="742758">
                   <a:extLst>
                     <a:ext uri="{9D8B030D-6E8A-4147-A177-3AD203B41FA5}">
                       <a16:colId xmlns:a16="http://schemas.microsoft.com/office/drawing/2014/main" val="4178682879"/>
                     </a:ext>
                   </a:extLst>
                 </a:gridCol>
-                <a:gridCol w="703580">
+                <a:gridCol w="742758">
                   <a:extLst>
                     <a:ext uri="{9D8B030D-6E8A-4147-A177-3AD203B41FA5}">
                       <a16:colId xmlns:a16="http://schemas.microsoft.com/office/drawing/2014/main" val="3160549755"/>
                     </a:ext>
                   </a:extLst>
                 </a:gridCol>
-                <a:gridCol w="3351976">
+                <a:gridCol w="3930161">
                   <a:extLst>
                     <a:ext uri="{9D8B030D-6E8A-4147-A177-3AD203B41FA5}">
                       <a16:colId xmlns:a16="http://schemas.microsoft.com/office/drawing/2014/main" val="444581452"/>
@@ -10845,8 +10845,12 @@
                     <a:lstStyle/>
                     <a:p>
                       <a:r>
-                        <a:rPr lang="en-US" dirty="0"/>
-                        <a:t>OK</a:t>
+                        <a:rPr lang="en-US" dirty="0">
+                          <a:solidFill>
+                            <a:srgbClr val="FF0000"/>
+                          </a:solidFill>
+                        </a:rPr>
+                        <a:t>NG</a:t>
                       </a:r>
                     </a:p>
                   </a:txBody>
@@ -10867,7 +10871,10 @@
                     <a:bodyPr/>
                     <a:lstStyle/>
                     <a:p>
-                      <a:endParaRPr lang="en-US"/>
+                      <a:r>
+                        <a:rPr lang="en-US" dirty="0"/>
+                        <a:t>Prepare the jar file</a:t>
+                      </a:r>
                     </a:p>
                   </a:txBody>
                   <a:tcPr/>
@@ -10915,8 +10922,12 @@
                     <a:lstStyle/>
                     <a:p>
                       <a:r>
-                        <a:rPr lang="en-US" dirty="0"/>
-                        <a:t>OK</a:t>
+                        <a:rPr lang="en-US" dirty="0">
+                          <a:solidFill>
+                            <a:srgbClr val="FF0000"/>
+                          </a:solidFill>
+                        </a:rPr>
+                        <a:t>NG</a:t>
                       </a:r>
                     </a:p>
                   </a:txBody>
@@ -10937,7 +10948,27 @@
                     <a:bodyPr/>
                     <a:lstStyle/>
                     <a:p>
-                      <a:endParaRPr lang="en-US"/>
+                      <a:pPr marL="0" marR="0" lvl="0" indent="0" algn="l" defTabSz="914400" rtl="0" eaLnBrk="1" fontAlgn="auto" latinLnBrk="0" hangingPunct="1">
+                        <a:lnSpc>
+                          <a:spcPct val="100000"/>
+                        </a:lnSpc>
+                        <a:spcBef>
+                          <a:spcPts val="0"/>
+                        </a:spcBef>
+                        <a:spcAft>
+                          <a:spcPts val="0"/>
+                        </a:spcAft>
+                        <a:buClrTx/>
+                        <a:buSzTx/>
+                        <a:buFontTx/>
+                        <a:buNone/>
+                        <a:tabLst/>
+                        <a:defRPr/>
+                      </a:pPr>
+                      <a:r>
+                        <a:rPr lang="en-US"/>
+                        <a:t>Prepare the jar file</a:t>
+                      </a:r>
                     </a:p>
                   </a:txBody>
                   <a:tcPr/>
@@ -11004,7 +11035,10 @@
                     <a:bodyPr/>
                     <a:lstStyle/>
                     <a:p>
-                      <a:endParaRPr lang="en-US" dirty="0"/>
+                      <a:r>
+                        <a:rPr lang="en-US" dirty="0"/>
+                        <a:t>Sample chart</a:t>
+                      </a:r>
                     </a:p>
                   </a:txBody>
                   <a:tcPr/>
@@ -11071,7 +11105,10 @@
                     <a:bodyPr/>
                     <a:lstStyle/>
                     <a:p>
-                      <a:endParaRPr lang="en-US"/>
+                      <a:r>
+                        <a:rPr lang="en-US" dirty="0"/>
+                        <a:t>Sample chart component report</a:t>
+                      </a:r>
                     </a:p>
                   </a:txBody>
                   <a:tcPr/>
@@ -11116,8 +11153,12 @@
                     <a:lstStyle/>
                     <a:p>
                       <a:r>
-                        <a:rPr lang="en-US" dirty="0"/>
-                        <a:t>OK</a:t>
+                        <a:rPr lang="en-US" dirty="0">
+                          <a:solidFill>
+                            <a:srgbClr val="FF0000"/>
+                          </a:solidFill>
+                        </a:rPr>
+                        <a:t>NG</a:t>
                       </a:r>
                     </a:p>
                   </a:txBody>
@@ -11138,7 +11179,18 @@
                     <a:bodyPr/>
                     <a:lstStyle/>
                     <a:p>
-                      <a:endParaRPr lang="en-US"/>
+                      <a:r>
+                        <a:rPr lang="en-US" dirty="0"/>
+                        <a:t>Use </a:t>
+                      </a:r>
+                      <a:r>
+                        <a:rPr lang="en-US" dirty="0" err="1"/>
+                        <a:t>xlsxdatasource</a:t>
+                      </a:r>
+                      <a:r>
+                        <a:rPr lang="en-US" dirty="0"/>
+                        <a:t> instead</a:t>
+                      </a:r>
                     </a:p>
                   </a:txBody>
                   <a:tcPr/>
@@ -11205,7 +11257,18 @@
                     <a:bodyPr/>
                     <a:lstStyle/>
                     <a:p>
-                      <a:endParaRPr lang="en-US"/>
+                      <a:r>
+                        <a:rPr lang="en-US" dirty="0"/>
+                        <a:t>Parse </a:t>
+                      </a:r>
+                      <a:r>
+                        <a:rPr lang="en-US" dirty="0" err="1"/>
+                        <a:t>xls</a:t>
+                      </a:r>
+                      <a:r>
+                        <a:rPr lang="en-US" dirty="0"/>
+                        <a:t> format and display</a:t>
+                      </a:r>
                     </a:p>
                   </a:txBody>
                   <a:tcPr/>
@@ -11272,7 +11335,10 @@
                     <a:bodyPr/>
                     <a:lstStyle/>
                     <a:p>
-                      <a:endParaRPr lang="en-US" dirty="0"/>
+                      <a:r>
+                        <a:rPr lang="en-US" dirty="0"/>
+                        <a:t>Math formula</a:t>
+                      </a:r>
                     </a:p>
                   </a:txBody>
                   <a:tcPr/>
@@ -11560,14 +11626,14 @@
           <p:nvPr>
             <p:extLst>
               <p:ext uri="{D42A27DB-BD31-4B8C-83A1-F6EECF244321}">
-                <p14:modId xmlns:p14="http://schemas.microsoft.com/office/powerpoint/2010/main" val="511934832"/>
+                <p14:modId xmlns:p14="http://schemas.microsoft.com/office/powerpoint/2010/main" val="1585055750"/>
               </p:ext>
             </p:extLst>
           </p:nvPr>
         </p:nvGraphicFramePr>
         <p:xfrm>
           <a:off x="649760" y="1783228"/>
-          <a:ext cx="6442520" cy="1112520"/>
+          <a:ext cx="7638663" cy="1112520"/>
         </p:xfrm>
         <a:graphic>
           <a:graphicData uri="http://schemas.openxmlformats.org/drawingml/2006/table">
@@ -11583,28 +11649,28 @@
                     </a:ext>
                   </a:extLst>
                 </a:gridCol>
-                <a:gridCol w="2055940">
+                <a:gridCol w="1597025">
                   <a:extLst>
                     <a:ext uri="{9D8B030D-6E8A-4147-A177-3AD203B41FA5}">
                       <a16:colId xmlns:a16="http://schemas.microsoft.com/office/drawing/2014/main" val="1870320283"/>
                     </a:ext>
                   </a:extLst>
                 </a:gridCol>
-                <a:gridCol w="1219200">
+                <a:gridCol w="1086633">
                   <a:extLst>
                     <a:ext uri="{9D8B030D-6E8A-4147-A177-3AD203B41FA5}">
                       <a16:colId xmlns:a16="http://schemas.microsoft.com/office/drawing/2014/main" val="4178682879"/>
                     </a:ext>
                   </a:extLst>
                 </a:gridCol>
-                <a:gridCol w="1219200">
+                <a:gridCol w="824082">
                   <a:extLst>
                     <a:ext uri="{9D8B030D-6E8A-4147-A177-3AD203B41FA5}">
                       <a16:colId xmlns:a16="http://schemas.microsoft.com/office/drawing/2014/main" val="3160549755"/>
                     </a:ext>
                   </a:extLst>
                 </a:gridCol>
-                <a:gridCol w="1219200">
+                <a:gridCol w="3401943">
                   <a:extLst>
                     <a:ext uri="{9D8B030D-6E8A-4147-A177-3AD203B41FA5}">
                       <a16:colId xmlns:a16="http://schemas.microsoft.com/office/drawing/2014/main" val="444581452"/>
@@ -11740,7 +11806,10 @@
                     <a:bodyPr/>
                     <a:lstStyle/>
                     <a:p>
-                      <a:endParaRPr lang="en-US"/>
+                      <a:r>
+                        <a:rPr lang="en-US" dirty="0"/>
+                        <a:t>Parse/display xlsx (Excel format)</a:t>
+                      </a:r>
                     </a:p>
                   </a:txBody>
                   <a:tcPr/>
@@ -11807,7 +11876,10 @@
                     <a:bodyPr/>
                     <a:lstStyle/>
                     <a:p>
-                      <a:endParaRPr lang="en-US" dirty="0"/>
+                      <a:r>
+                        <a:rPr lang="en-US" dirty="0"/>
+                        <a:t>Parse/display  xml format</a:t>
+                      </a:r>
                     </a:p>
                   </a:txBody>
                   <a:tcPr/>

</xml_diff>

<commit_message>
Jasper Report 6.7.0 vs. 5.5.1
</commit_message>
<xml_diff>
--- a/15_Ch73_API_Summary.pptx
+++ b/15_Ch73_API_Summary.pptx
@@ -3712,13 +3712,8 @@
                   <a:schemeClr val="tx1"/>
                 </a:solidFill>
               </a:rPr>
-              <a:t>JasperReport API Summary</a:t>
+              <a:t>JasperReport Project Version Comparison (6):</a:t>
             </a:r>
-            <a:endParaRPr lang="en-US" sz="1800" dirty="0">
-              <a:solidFill>
-                <a:schemeClr val="tx1"/>
-              </a:solidFill>
-            </a:endParaRPr>
           </a:p>
         </p:txBody>
       </p:sp>
@@ -4810,13 +4805,8 @@
                   <a:schemeClr val="tx1"/>
                 </a:solidFill>
               </a:rPr>
-              <a:t>JasperReport API Summary</a:t>
+              <a:t>JasperReport Project Version Comparison (7):</a:t>
             </a:r>
-            <a:endParaRPr lang="en-US" sz="1800" dirty="0">
-              <a:solidFill>
-                <a:schemeClr val="tx1"/>
-              </a:solidFill>
-            </a:endParaRPr>
           </a:p>
         </p:txBody>
       </p:sp>
@@ -5952,14 +5942,14 @@
               <a:buChar char="u"/>
             </a:pPr>
             <a:r>
-              <a:rPr lang="en-US" sz="1800" b="1" dirty="0">
+              <a:rPr lang="en-US" sz="1800" b="1">
                 <a:solidFill>
                   <a:schemeClr val="tx1"/>
                 </a:solidFill>
               </a:rPr>
-              <a:t>JasperReport API Summary</a:t>
+              <a:t>JasperReport Project Version Comparison (8):</a:t>
             </a:r>
-            <a:endParaRPr lang="en-US" sz="1800" dirty="0">
+            <a:endParaRPr lang="en-US" sz="1800" b="1" dirty="0">
               <a:solidFill>
                 <a:schemeClr val="tx1"/>
               </a:solidFill>
@@ -7997,7 +7987,7 @@
         <p:spPr>
           <a:xfrm>
             <a:off x="467544" y="1340767"/>
-            <a:ext cx="8136904" cy="288033"/>
+            <a:ext cx="8136904" cy="648073"/>
           </a:xfrm>
           <a:ln>
             <a:solidFill>
@@ -8025,13 +8015,26 @@
                   <a:schemeClr val="tx1"/>
                 </a:solidFill>
               </a:rPr>
-              <a:t>JasperReport API Summary</a:t>
+              <a:t>JasperReport Project Version Comparison (1): </a:t>
             </a:r>
-            <a:endParaRPr lang="en-US" sz="1800" dirty="0">
-              <a:solidFill>
-                <a:schemeClr val="tx1"/>
-              </a:solidFill>
-            </a:endParaRPr>
+          </a:p>
+          <a:p>
+            <a:pPr marL="342900" indent="-342900" algn="l">
+              <a:buClr>
+                <a:srgbClr val="0070C0"/>
+              </a:buClr>
+              <a:buSzPct val="80000"/>
+              <a:buFont typeface="Wingdings" pitchFamily="2" charset="2"/>
+              <a:buChar char="u"/>
+            </a:pPr>
+            <a:r>
+              <a:rPr lang="en-US" sz="1800" dirty="0">
+                <a:solidFill>
+                  <a:schemeClr val="tx1"/>
+                </a:solidFill>
+              </a:rPr>
+              <a:t>OK: Pass, NG: Not Good, NA: Not Available</a:t>
+            </a:r>
           </a:p>
         </p:txBody>
       </p:sp>
@@ -8162,12 +8165,16 @@
             <a:graphicFrameLocks noGrp="1"/>
           </p:cNvGraphicFramePr>
           <p:nvPr>
-            <p:extLst/>
+            <p:extLst>
+              <p:ext uri="{D42A27DB-BD31-4B8C-83A1-F6EECF244321}">
+                <p14:modId xmlns:p14="http://schemas.microsoft.com/office/powerpoint/2010/main" val="2125189906"/>
+              </p:ext>
+            </p:extLst>
           </p:nvPr>
         </p:nvGraphicFramePr>
         <p:xfrm>
-          <a:off x="611560" y="1844824"/>
-          <a:ext cx="8215028" cy="4074160"/>
+          <a:off x="457200" y="2109759"/>
+          <a:ext cx="8564724" cy="4074160"/>
         </p:xfrm>
         <a:graphic>
           <a:graphicData uri="http://schemas.openxmlformats.org/drawingml/2006/table">
@@ -8176,35 +8183,35 @@
                 <a:tableStyleId>{5C22544A-7EE6-4342-B048-85BDC9FD1C3A}</a:tableStyleId>
               </a:tblPr>
               <a:tblGrid>
-                <a:gridCol w="728980">
+                <a:gridCol w="760011">
                   <a:extLst>
                     <a:ext uri="{9D8B030D-6E8A-4147-A177-3AD203B41FA5}">
                       <a16:colId xmlns:a16="http://schemas.microsoft.com/office/drawing/2014/main" val="425712739"/>
                     </a:ext>
                   </a:extLst>
                 </a:gridCol>
-                <a:gridCol w="1812481">
+                <a:gridCol w="1889634">
                   <a:extLst>
                     <a:ext uri="{9D8B030D-6E8A-4147-A177-3AD203B41FA5}">
                       <a16:colId xmlns:a16="http://schemas.microsoft.com/office/drawing/2014/main" val="1870320283"/>
                     </a:ext>
                   </a:extLst>
                 </a:gridCol>
-                <a:gridCol w="703580">
+                <a:gridCol w="733530">
                   <a:extLst>
                     <a:ext uri="{9D8B030D-6E8A-4147-A177-3AD203B41FA5}">
                       <a16:colId xmlns:a16="http://schemas.microsoft.com/office/drawing/2014/main" val="4178682879"/>
                     </a:ext>
                   </a:extLst>
                 </a:gridCol>
-                <a:gridCol w="703580">
+                <a:gridCol w="733530">
                   <a:extLst>
                     <a:ext uri="{9D8B030D-6E8A-4147-A177-3AD203B41FA5}">
                       <a16:colId xmlns:a16="http://schemas.microsoft.com/office/drawing/2014/main" val="3160549755"/>
                     </a:ext>
                   </a:extLst>
                 </a:gridCol>
-                <a:gridCol w="4266407">
+                <a:gridCol w="4448019">
                   <a:extLst>
                     <a:ext uri="{9D8B030D-6E8A-4147-A177-3AD203B41FA5}">
                       <a16:colId xmlns:a16="http://schemas.microsoft.com/office/drawing/2014/main" val="444581452"/>
@@ -8330,17 +8337,23 @@
                     <a:bodyPr/>
                     <a:lstStyle/>
                     <a:p>
-                      <a:endParaRPr lang="en-US"/>
-                    </a:p>
-                  </a:txBody>
-                  <a:tcPr/>
-                </a:tc>
-                <a:tc>
-                  <a:txBody>
-                    <a:bodyPr/>
-                    <a:lstStyle/>
-                    <a:p>
-                      <a:endParaRPr lang="en-US"/>
+                      <a:r>
+                        <a:rPr lang="en-US" dirty="0"/>
+                        <a:t>OK</a:t>
+                      </a:r>
+                    </a:p>
+                  </a:txBody>
+                  <a:tcPr/>
+                </a:tc>
+                <a:tc>
+                  <a:txBody>
+                    <a:bodyPr/>
+                    <a:lstStyle/>
+                    <a:p>
+                      <a:r>
+                        <a:rPr lang="en-US" dirty="0"/>
+                        <a:t>Change design report color</a:t>
+                      </a:r>
                     </a:p>
                   </a:txBody>
                   <a:tcPr/>
@@ -8397,17 +8410,23 @@
                     <a:bodyPr/>
                     <a:lstStyle/>
                     <a:p>
-                      <a:endParaRPr lang="en-US"/>
-                    </a:p>
-                  </a:txBody>
-                  <a:tcPr/>
-                </a:tc>
-                <a:tc>
-                  <a:txBody>
-                    <a:bodyPr/>
-                    <a:lstStyle/>
-                    <a:p>
-                      <a:endParaRPr lang="en-US" dirty="0"/>
+                      <a:r>
+                        <a:rPr lang="en-US" dirty="0"/>
+                        <a:t>OK</a:t>
+                      </a:r>
+                    </a:p>
+                  </a:txBody>
+                  <a:tcPr/>
+                </a:tc>
+                <a:tc>
+                  <a:txBody>
+                    <a:bodyPr/>
+                    <a:lstStyle/>
+                    <a:p>
+                      <a:r>
+                        <a:rPr lang="en-US" dirty="0"/>
+                        <a:t>compile1 (compile)/compile2 (re-compile).</a:t>
+                      </a:r>
                     </a:p>
                   </a:txBody>
                   <a:tcPr/>
@@ -8464,17 +8483,23 @@
                     <a:bodyPr/>
                     <a:lstStyle/>
                     <a:p>
-                      <a:endParaRPr lang="en-US"/>
-                    </a:p>
-                  </a:txBody>
-                  <a:tcPr/>
-                </a:tc>
-                <a:tc>
-                  <a:txBody>
-                    <a:bodyPr/>
-                    <a:lstStyle/>
-                    <a:p>
-                      <a:endParaRPr lang="en-US"/>
+                      <a:r>
+                        <a:rPr lang="en-US" dirty="0"/>
+                        <a:t>OK</a:t>
+                      </a:r>
+                    </a:p>
+                  </a:txBody>
+                  <a:tcPr/>
+                </a:tc>
+                <a:tc>
+                  <a:txBody>
+                    <a:bodyPr/>
+                    <a:lstStyle/>
+                    <a:p>
+                      <a:r>
+                        <a:rPr lang="en-US" dirty="0"/>
+                        <a:t>Update report design update1 and update 2.</a:t>
+                      </a:r>
                     </a:p>
                   </a:txBody>
                   <a:tcPr/>
@@ -8530,17 +8555,23 @@
                     <a:bodyPr/>
                     <a:lstStyle/>
                     <a:p>
-                      <a:endParaRPr lang="en-US" dirty="0"/>
-                    </a:p>
-                  </a:txBody>
-                  <a:tcPr/>
-                </a:tc>
-                <a:tc>
-                  <a:txBody>
-                    <a:bodyPr/>
-                    <a:lstStyle/>
-                    <a:p>
-                      <a:endParaRPr lang="en-US" dirty="0"/>
+                      <a:r>
+                        <a:rPr lang="en-US" dirty="0"/>
+                        <a:t>OK</a:t>
+                      </a:r>
+                    </a:p>
+                  </a:txBody>
+                  <a:tcPr/>
+                </a:tc>
+                <a:tc>
+                  <a:txBody>
+                    <a:bodyPr/>
+                    <a:lstStyle/>
+                    <a:p>
+                      <a:r>
+                        <a:rPr lang="en-US" dirty="0"/>
+                        <a:t>Demo Bar code</a:t>
+                      </a:r>
                     </a:p>
                   </a:txBody>
                   <a:tcPr/>
@@ -8596,17 +8627,23 @@
                     <a:bodyPr/>
                     <a:lstStyle/>
                     <a:p>
-                      <a:endParaRPr lang="en-US"/>
-                    </a:p>
-                  </a:txBody>
-                  <a:tcPr/>
-                </a:tc>
-                <a:tc>
-                  <a:txBody>
-                    <a:bodyPr/>
-                    <a:lstStyle/>
-                    <a:p>
-                      <a:endParaRPr lang="en-US"/>
+                      <a:r>
+                        <a:rPr lang="en-US" dirty="0"/>
+                        <a:t>OK</a:t>
+                      </a:r>
+                    </a:p>
+                  </a:txBody>
+                  <a:tcPr/>
+                </a:tc>
+                <a:tc>
+                  <a:txBody>
+                    <a:bodyPr/>
+                    <a:lstStyle/>
+                    <a:p>
+                      <a:r>
+                        <a:rPr lang="en-US" dirty="0"/>
+                        <a:t>Display Bar code</a:t>
+                      </a:r>
                     </a:p>
                   </a:txBody>
                   <a:tcPr/>
@@ -8663,17 +8700,23 @@
                     <a:bodyPr/>
                     <a:lstStyle/>
                     <a:p>
-                      <a:endParaRPr lang="en-US" dirty="0"/>
-                    </a:p>
-                  </a:txBody>
-                  <a:tcPr/>
-                </a:tc>
-                <a:tc>
-                  <a:txBody>
-                    <a:bodyPr/>
-                    <a:lstStyle/>
-                    <a:p>
-                      <a:endParaRPr lang="en-US" dirty="0"/>
+                      <a:r>
+                        <a:rPr lang="en-US" dirty="0"/>
+                        <a:t>OK</a:t>
+                      </a:r>
+                    </a:p>
+                  </a:txBody>
+                  <a:tcPr/>
+                </a:tc>
+                <a:tc>
+                  <a:txBody>
+                    <a:bodyPr/>
+                    <a:lstStyle/>
+                    <a:p>
+                      <a:r>
+                        <a:rPr lang="en-US" dirty="0"/>
+                        <a:t>Display view1-3. Print PDF, HTML, XLS, etc.</a:t>
+                      </a:r>
                     </a:p>
                   </a:txBody>
                   <a:tcPr/>
@@ -8729,17 +8772,27 @@
                     <a:bodyPr/>
                     <a:lstStyle/>
                     <a:p>
-                      <a:endParaRPr lang="en-US"/>
-                    </a:p>
-                  </a:txBody>
-                  <a:tcPr/>
-                </a:tc>
-                <a:tc>
-                  <a:txBody>
-                    <a:bodyPr/>
-                    <a:lstStyle/>
-                    <a:p>
-                      <a:endParaRPr lang="en-US"/>
+                      <a:r>
+                        <a:rPr lang="en-US" b="1" dirty="0">
+                          <a:solidFill>
+                            <a:srgbClr val="FF0000"/>
+                          </a:solidFill>
+                        </a:rPr>
+                        <a:t>NA</a:t>
+                      </a:r>
+                    </a:p>
+                  </a:txBody>
+                  <a:tcPr/>
+                </a:tc>
+                <a:tc>
+                  <a:txBody>
+                    <a:bodyPr/>
+                    <a:lstStyle/>
+                    <a:p>
+                      <a:r>
+                        <a:rPr lang="en-US" dirty="0"/>
+                        <a:t>Book Table of Content, Tab, charts, and etc.</a:t>
+                      </a:r>
                     </a:p>
                   </a:txBody>
                   <a:tcPr/>
@@ -8796,17 +8849,27 @@
                     <a:bodyPr/>
                     <a:lstStyle/>
                     <a:p>
-                      <a:endParaRPr lang="en-US"/>
-                    </a:p>
-                  </a:txBody>
-                  <a:tcPr/>
-                </a:tc>
-                <a:tc>
-                  <a:txBody>
-                    <a:bodyPr/>
-                    <a:lstStyle/>
-                    <a:p>
-                      <a:endParaRPr lang="en-US"/>
+                      <a:r>
+                        <a:rPr lang="en-US" b="1" dirty="0">
+                          <a:solidFill>
+                            <a:srgbClr val="FF0000"/>
+                          </a:solidFill>
+                        </a:rPr>
+                        <a:t>NA</a:t>
+                      </a:r>
+                    </a:p>
+                  </a:txBody>
+                  <a:tcPr/>
+                </a:tc>
+                <a:tc>
+                  <a:txBody>
+                    <a:bodyPr/>
+                    <a:lstStyle/>
+                    <a:p>
+                      <a:r>
+                        <a:rPr lang="en-US" dirty="0"/>
+                        <a:t>Compose Bar and line chart.</a:t>
+                      </a:r>
                     </a:p>
                   </a:txBody>
                   <a:tcPr/>
@@ -8862,7 +8925,14 @@
                     <a:bodyPr/>
                     <a:lstStyle/>
                     <a:p>
-                      <a:endParaRPr lang="en-US"/>
+                      <a:r>
+                        <a:rPr lang="en-US" b="1" dirty="0">
+                          <a:solidFill>
+                            <a:srgbClr val="FF0000"/>
+                          </a:solidFill>
+                        </a:rPr>
+                        <a:t>NG</a:t>
+                      </a:r>
                     </a:p>
                   </a:txBody>
                   <a:tcPr/>
@@ -8932,7 +9002,10 @@
                     <a:bodyPr/>
                     <a:lstStyle/>
                     <a:p>
-                      <a:endParaRPr lang="en-US" dirty="0"/>
+                      <a:r>
+                        <a:rPr lang="en-US" dirty="0"/>
+                        <a:t>OK</a:t>
+                      </a:r>
                     </a:p>
                   </a:txBody>
                   <a:tcPr/>
@@ -9066,7 +9139,7 @@
         <p:spPr>
           <a:xfrm>
             <a:off x="467544" y="1340767"/>
-            <a:ext cx="8136904" cy="288033"/>
+            <a:ext cx="8136904" cy="398617"/>
           </a:xfrm>
           <a:ln>
             <a:solidFill>
@@ -9094,13 +9167,8 @@
                   <a:schemeClr val="tx1"/>
                 </a:solidFill>
               </a:rPr>
-              <a:t>JasperReport API Summary</a:t>
+              <a:t>JasperReport Project Version Comparison (2):</a:t>
             </a:r>
-            <a:endParaRPr lang="en-US" sz="1800" dirty="0">
-              <a:solidFill>
-                <a:schemeClr val="tx1"/>
-              </a:solidFill>
-            </a:endParaRPr>
           </a:p>
         </p:txBody>
       </p:sp>
@@ -9233,14 +9301,14 @@
           <p:nvPr>
             <p:extLst>
               <p:ext uri="{D42A27DB-BD31-4B8C-83A1-F6EECF244321}">
-                <p14:modId xmlns:p14="http://schemas.microsoft.com/office/powerpoint/2010/main" val="6624341"/>
+                <p14:modId xmlns:p14="http://schemas.microsoft.com/office/powerpoint/2010/main" val="122109268"/>
               </p:ext>
             </p:extLst>
           </p:nvPr>
         </p:nvGraphicFramePr>
         <p:xfrm>
-          <a:off x="611560" y="1783228"/>
-          <a:ext cx="7056784" cy="4079240"/>
+          <a:off x="650565" y="1844824"/>
+          <a:ext cx="7770861" cy="4079240"/>
         </p:xfrm>
         <a:graphic>
           <a:graphicData uri="http://schemas.openxmlformats.org/drawingml/2006/table">
@@ -9249,7 +9317,7 @@
                 <a:tableStyleId>{5C22544A-7EE6-4342-B048-85BDC9FD1C3A}</a:tableStyleId>
               </a:tblPr>
               <a:tblGrid>
-                <a:gridCol w="728980">
+                <a:gridCol w="836904">
                   <a:extLst>
                     <a:ext uri="{9D8B030D-6E8A-4147-A177-3AD203B41FA5}">
                       <a16:colId xmlns:a16="http://schemas.microsoft.com/office/drawing/2014/main" val="425712739"/>
@@ -9263,21 +9331,21 @@
                     </a:ext>
                   </a:extLst>
                 </a:gridCol>
-                <a:gridCol w="1219200">
+                <a:gridCol w="1016356">
                   <a:extLst>
                     <a:ext uri="{9D8B030D-6E8A-4147-A177-3AD203B41FA5}">
                       <a16:colId xmlns:a16="http://schemas.microsoft.com/office/drawing/2014/main" val="4178682879"/>
                     </a:ext>
                   </a:extLst>
                 </a:gridCol>
-                <a:gridCol w="1219200">
+                <a:gridCol w="807744">
                   <a:extLst>
                     <a:ext uri="{9D8B030D-6E8A-4147-A177-3AD203B41FA5}">
                       <a16:colId xmlns:a16="http://schemas.microsoft.com/office/drawing/2014/main" val="3160549755"/>
                     </a:ext>
                   </a:extLst>
                 </a:gridCol>
-                <a:gridCol w="1833464">
+                <a:gridCol w="3053917">
                   <a:extLst>
                     <a:ext uri="{9D8B030D-6E8A-4147-A177-3AD203B41FA5}">
                       <a16:colId xmlns:a16="http://schemas.microsoft.com/office/drawing/2014/main" val="444581452"/>
@@ -9402,7 +9470,14 @@
                     <a:bodyPr/>
                     <a:lstStyle/>
                     <a:p>
-                      <a:endParaRPr lang="en-US"/>
+                      <a:r>
+                        <a:rPr lang="en-US" b="1" dirty="0">
+                          <a:solidFill>
+                            <a:srgbClr val="FF0000"/>
+                          </a:solidFill>
+                        </a:rPr>
+                        <a:t>NG</a:t>
+                      </a:r>
                     </a:p>
                   </a:txBody>
                   <a:tcPr/>
@@ -9447,7 +9522,7 @@
                     <a:p>
                       <a:r>
                         <a:rPr lang="en-US" dirty="0" err="1"/>
-                        <a:t>cvsdatasource</a:t>
+                        <a:t>csvdatasource</a:t>
                       </a:r>
                       <a:endParaRPr lang="en-US" dirty="0"/>
                     </a:p>
@@ -9472,17 +9547,23 @@
                     <a:bodyPr/>
                     <a:lstStyle/>
                     <a:p>
-                      <a:endParaRPr lang="en-US"/>
-                    </a:p>
-                  </a:txBody>
-                  <a:tcPr/>
-                </a:tc>
-                <a:tc>
-                  <a:txBody>
-                    <a:bodyPr/>
-                    <a:lstStyle/>
-                    <a:p>
-                      <a:endParaRPr lang="en-US"/>
+                      <a:r>
+                        <a:rPr lang="en-US" dirty="0"/>
+                        <a:t>OK</a:t>
+                      </a:r>
+                    </a:p>
+                  </a:txBody>
+                  <a:tcPr/>
+                </a:tc>
+                <a:tc>
+                  <a:txBody>
+                    <a:bodyPr/>
+                    <a:lstStyle/>
+                    <a:p>
+                      <a:r>
+                        <a:rPr lang="en-US" dirty="0"/>
+                        <a:t>Address report</a:t>
+                      </a:r>
                     </a:p>
                   </a:txBody>
                   <a:tcPr/>
@@ -9543,17 +9624,24 @@
                     <a:bodyPr/>
                     <a:lstStyle/>
                     <a:p>
-                      <a:endParaRPr lang="en-US"/>
-                    </a:p>
-                  </a:txBody>
-                  <a:tcPr/>
-                </a:tc>
-                <a:tc>
-                  <a:txBody>
-                    <a:bodyPr/>
-                    <a:lstStyle/>
-                    <a:p>
-                      <a:endParaRPr lang="en-US"/>
+                      <a:r>
+                        <a:rPr lang="en-US" b="1" dirty="0">
+                          <a:solidFill>
+                            <a:srgbClr val="FF0000"/>
+                          </a:solidFill>
+                        </a:rPr>
+                        <a:t>NA</a:t>
+                      </a:r>
+                    </a:p>
+                  </a:txBody>
+                  <a:tcPr/>
+                </a:tc>
+                <a:tc>
+                  <a:txBody>
+                    <a:bodyPr/>
+                    <a:lstStyle/>
+                    <a:p>
+                      <a:endParaRPr lang="en-US" dirty="0"/>
                     </a:p>
                   </a:txBody>
                   <a:tcPr/>
@@ -9610,17 +9698,23 @@
                     <a:bodyPr/>
                     <a:lstStyle/>
                     <a:p>
-                      <a:endParaRPr lang="en-US"/>
-                    </a:p>
-                  </a:txBody>
-                  <a:tcPr/>
-                </a:tc>
-                <a:tc>
-                  <a:txBody>
-                    <a:bodyPr/>
-                    <a:lstStyle/>
-                    <a:p>
-                      <a:endParaRPr lang="en-US"/>
+                      <a:r>
+                        <a:rPr lang="en-US" dirty="0"/>
+                        <a:t>OK</a:t>
+                      </a:r>
+                    </a:p>
+                  </a:txBody>
+                  <a:tcPr/>
+                </a:tc>
+                <a:tc>
+                  <a:txBody>
+                    <a:bodyPr/>
+                    <a:lstStyle/>
+                    <a:p>
+                      <a:r>
+                        <a:rPr lang="en-US" dirty="0"/>
+                        <a:t>fill1-3 data source.</a:t>
+                      </a:r>
                     </a:p>
                   </a:txBody>
                   <a:tcPr/>
@@ -9652,7 +9746,7 @@
                     <a:p>
                       <a:r>
                         <a:rPr lang="en-US" dirty="0" err="1"/>
-                        <a:t>datarange</a:t>
+                        <a:t>daterange</a:t>
                       </a:r>
                       <a:endParaRPr lang="en-US" dirty="0"/>
                     </a:p>
@@ -9677,17 +9771,27 @@
                     <a:bodyPr/>
                     <a:lstStyle/>
                     <a:p>
-                      <a:endParaRPr lang="en-US"/>
-                    </a:p>
-                  </a:txBody>
-                  <a:tcPr/>
-                </a:tc>
-                <a:tc>
-                  <a:txBody>
-                    <a:bodyPr/>
-                    <a:lstStyle/>
-                    <a:p>
-                      <a:endParaRPr lang="en-US"/>
+                      <a:r>
+                        <a:rPr lang="en-US" b="1" dirty="0">
+                          <a:solidFill>
+                            <a:srgbClr val="FF0000"/>
+                          </a:solidFill>
+                        </a:rPr>
+                        <a:t>NA</a:t>
+                      </a:r>
+                    </a:p>
+                  </a:txBody>
+                  <a:tcPr/>
+                </a:tc>
+                <a:tc>
+                  <a:txBody>
+                    <a:bodyPr/>
+                    <a:lstStyle/>
+                    <a:p>
+                      <a:r>
+                        <a:rPr lang="en-US" dirty="0"/>
+                        <a:t>Date range report</a:t>
+                      </a:r>
                     </a:p>
                   </a:txBody>
                   <a:tcPr/>
@@ -9744,17 +9848,23 @@
                     <a:bodyPr/>
                     <a:lstStyle/>
                     <a:p>
-                      <a:endParaRPr lang="en-US" dirty="0"/>
-                    </a:p>
-                  </a:txBody>
-                  <a:tcPr/>
-                </a:tc>
-                <a:tc>
-                  <a:txBody>
-                    <a:bodyPr/>
-                    <a:lstStyle/>
-                    <a:p>
-                      <a:endParaRPr lang="en-US" dirty="0"/>
+                      <a:r>
+                        <a:rPr lang="en-US" dirty="0"/>
+                        <a:t>OK</a:t>
+                      </a:r>
+                    </a:p>
+                  </a:txBody>
+                  <a:tcPr/>
+                </a:tc>
+                <a:tc>
+                  <a:txBody>
+                    <a:bodyPr/>
+                    <a:lstStyle/>
+                    <a:p>
+                      <a:r>
+                        <a:rPr lang="en-US" dirty="0"/>
+                        <a:t>Display Movie Database</a:t>
+                      </a:r>
                     </a:p>
                   </a:txBody>
                   <a:tcPr/>
@@ -9811,17 +9921,27 @@
                     <a:bodyPr/>
                     <a:lstStyle/>
                     <a:p>
-                      <a:endParaRPr lang="en-US"/>
-                    </a:p>
-                  </a:txBody>
-                  <a:tcPr/>
-                </a:tc>
-                <a:tc>
-                  <a:txBody>
-                    <a:bodyPr/>
-                    <a:lstStyle/>
-                    <a:p>
-                      <a:endParaRPr lang="en-US"/>
+                      <a:r>
+                        <a:rPr lang="en-US" b="1" dirty="0">
+                          <a:solidFill>
+                            <a:srgbClr val="FF0000"/>
+                          </a:solidFill>
+                        </a:rPr>
+                        <a:t>NA</a:t>
+                      </a:r>
+                    </a:p>
+                  </a:txBody>
+                  <a:tcPr/>
+                </a:tc>
+                <a:tc>
+                  <a:txBody>
+                    <a:bodyPr/>
+                    <a:lstStyle/>
+                    <a:p>
+                      <a:r>
+                        <a:rPr lang="en-US" dirty="0"/>
+                        <a:t>Excel Data Adapter</a:t>
+                      </a:r>
                     </a:p>
                   </a:txBody>
                   <a:tcPr/>
@@ -9877,19 +9997,22 @@
                     <a:bodyPr/>
                     <a:lstStyle/>
                     <a:p>
-                      <a:endParaRPr lang="en-US"/>
-                    </a:p>
-                  </a:txBody>
-                  <a:tcPr/>
-                </a:tc>
-                <a:tc>
-                  <a:txBody>
-                    <a:bodyPr/>
-                    <a:lstStyle/>
-                    <a:p>
-                      <a:r>
-                        <a:rPr lang="en-US" dirty="0"/>
-                        <a:t>Font</a:t>
+                      <a:r>
+                        <a:rPr lang="en-US" dirty="0"/>
+                        <a:t>OK</a:t>
+                      </a:r>
+                    </a:p>
+                  </a:txBody>
+                  <a:tcPr/>
+                </a:tc>
+                <a:tc>
+                  <a:txBody>
+                    <a:bodyPr/>
+                    <a:lstStyle/>
+                    <a:p>
+                      <a:r>
+                        <a:rPr lang="en-US" dirty="0"/>
+                        <a:t>Font Size.</a:t>
                       </a:r>
                     </a:p>
                   </a:txBody>
@@ -9946,7 +10069,10 @@
                     <a:bodyPr/>
                     <a:lstStyle/>
                     <a:p>
-                      <a:endParaRPr lang="en-US"/>
+                      <a:r>
+                        <a:rPr lang="en-US" dirty="0"/>
+                        <a:t>OK</a:t>
+                      </a:r>
                     </a:p>
                   </a:txBody>
                   <a:tcPr/>
@@ -10015,17 +10141,23 @@
                     <a:bodyPr/>
                     <a:lstStyle/>
                     <a:p>
-                      <a:endParaRPr lang="en-US"/>
-                    </a:p>
-                  </a:txBody>
-                  <a:tcPr/>
-                </a:tc>
-                <a:tc>
-                  <a:txBody>
-                    <a:bodyPr/>
-                    <a:lstStyle/>
-                    <a:p>
-                      <a:endParaRPr lang="en-US" dirty="0"/>
+                      <a:r>
+                        <a:rPr lang="en-US" dirty="0"/>
+                        <a:t>OK</a:t>
+                      </a:r>
+                    </a:p>
+                  </a:txBody>
+                  <a:tcPr/>
+                </a:tc>
+                <a:tc>
+                  <a:txBody>
+                    <a:bodyPr/>
+                    <a:lstStyle/>
+                    <a:p>
+                      <a:r>
+                        <a:rPr lang="en-US" dirty="0"/>
+                        <a:t>Display built-in function</a:t>
+                      </a:r>
                     </a:p>
                   </a:txBody>
                   <a:tcPr/>
@@ -10174,13 +10306,8 @@
                   <a:schemeClr val="tx1"/>
                 </a:solidFill>
               </a:rPr>
-              <a:t>JasperReport API Summary</a:t>
+              <a:t>JasperReport Project Version Comparison (3):</a:t>
             </a:r>
-            <a:endParaRPr lang="en-US" sz="1800" dirty="0">
-              <a:solidFill>
-                <a:schemeClr val="tx1"/>
-              </a:solidFill>
-            </a:endParaRPr>
           </a:p>
         </p:txBody>
       </p:sp>
@@ -11239,13 +11366,8 @@
                   <a:schemeClr val="tx1"/>
                 </a:solidFill>
               </a:rPr>
-              <a:t>JasperReport API Summary</a:t>
+              <a:t>JasperReport Project Version Comparison (4):</a:t>
             </a:r>
-            <a:endParaRPr lang="en-US" sz="1800" dirty="0">
-              <a:solidFill>
-                <a:schemeClr val="tx1"/>
-              </a:solidFill>
-            </a:endParaRPr>
           </a:p>
         </p:txBody>
       </p:sp>
@@ -12324,13 +12446,8 @@
                   <a:schemeClr val="tx1"/>
                 </a:solidFill>
               </a:rPr>
-              <a:t>JasperReport API Summary</a:t>
+              <a:t>JasperReport Project Version Comparison (5):</a:t>
             </a:r>
-            <a:endParaRPr lang="en-US" sz="1800" dirty="0">
-              <a:solidFill>
-                <a:schemeClr val="tx1"/>
-              </a:solidFill>
-            </a:endParaRPr>
           </a:p>
         </p:txBody>
       </p:sp>

</xml_diff>

<commit_message>
Add download sites for 0.x-4.x and 5.x-6.x
</commit_message>
<xml_diff>
--- a/15_Ch73_API_Summary.pptx
+++ b/15_Ch73_API_Summary.pptx
@@ -9162,8 +9162,8 @@
         </p:nvSpPr>
         <p:spPr>
           <a:xfrm>
-            <a:off x="467544" y="1340767"/>
-            <a:ext cx="8136904" cy="398617"/>
+            <a:off x="467544" y="1340766"/>
+            <a:ext cx="8136904" cy="1656185"/>
           </a:xfrm>
           <a:ln>
             <a:solidFill>
@@ -9193,6 +9193,70 @@
               </a:rPr>
               <a:t>JasperReport Project Version Comparison (2):</a:t>
             </a:r>
+          </a:p>
+          <a:p>
+            <a:pPr marL="342900" indent="-342900" algn="l">
+              <a:buClr>
+                <a:srgbClr val="0070C0"/>
+              </a:buClr>
+              <a:buSzPct val="80000"/>
+              <a:buFont typeface="Wingdings" pitchFamily="2" charset="2"/>
+              <a:buChar char="u"/>
+            </a:pPr>
+            <a:r>
+              <a:rPr lang="en-US" sz="1800" b="1" dirty="0">
+                <a:solidFill>
+                  <a:schemeClr val="tx1"/>
+                </a:solidFill>
+              </a:rPr>
+              <a:t>Download Version 0.x.x to 4.x.x: </a:t>
+            </a:r>
+            <a:r>
+              <a:rPr lang="en-US" sz="1800" b="1" dirty="0">
+                <a:solidFill>
+                  <a:schemeClr val="tx1"/>
+                </a:solidFill>
+                <a:hlinkClick r:id="rId2"/>
+              </a:rPr>
+              <a:t>https://sourceforge.net/projects/jasperreports/files/archive/</a:t>
+            </a:r>
+            <a:endParaRPr lang="en-US" sz="1800" b="1" dirty="0">
+              <a:solidFill>
+                <a:schemeClr val="tx1"/>
+              </a:solidFill>
+            </a:endParaRPr>
+          </a:p>
+          <a:p>
+            <a:pPr marL="342900" indent="-342900" algn="l">
+              <a:buClr>
+                <a:srgbClr val="0070C0"/>
+              </a:buClr>
+              <a:buSzPct val="80000"/>
+              <a:buFont typeface="Wingdings" pitchFamily="2" charset="2"/>
+              <a:buChar char="u"/>
+            </a:pPr>
+            <a:r>
+              <a:rPr lang="en-US" sz="1800" b="1" dirty="0">
+                <a:solidFill>
+                  <a:schemeClr val="tx1"/>
+                </a:solidFill>
+              </a:rPr>
+              <a:t>Download Version 5.0.0 to 6.7.0: </a:t>
+            </a:r>
+            <a:r>
+              <a:rPr lang="en-US" sz="1800" b="1" dirty="0">
+                <a:solidFill>
+                  <a:schemeClr val="tx1"/>
+                </a:solidFill>
+                <a:hlinkClick r:id="rId3"/>
+              </a:rPr>
+              <a:t>https://sourceforge.net/projects/jasperreports/files/jasperreports/</a:t>
+            </a:r>
+            <a:endParaRPr lang="en-US" sz="1800" b="1" dirty="0">
+              <a:solidFill>
+                <a:schemeClr val="tx1"/>
+              </a:solidFill>
+            </a:endParaRPr>
           </a:p>
         </p:txBody>
       </p:sp>
@@ -9325,13 +9389,13 @@
           <p:nvPr>
             <p:extLst>
               <p:ext uri="{D42A27DB-BD31-4B8C-83A1-F6EECF244321}">
-                <p14:modId xmlns:p14="http://schemas.microsoft.com/office/powerpoint/2010/main" val="3650135685"/>
+                <p14:modId xmlns:p14="http://schemas.microsoft.com/office/powerpoint/2010/main" val="1317743724"/>
               </p:ext>
             </p:extLst>
           </p:nvPr>
         </p:nvGraphicFramePr>
         <p:xfrm>
-          <a:off x="1524000" y="1912684"/>
+          <a:off x="1835696" y="3225202"/>
           <a:ext cx="4031813" cy="1112520"/>
         </p:xfrm>
         <a:graphic>

</xml_diff>